<commit_message>
add new map img and testi
</commit_message>
<xml_diff>
--- a/mapbg.pptx
+++ b/mapbg.pptx
@@ -268,7 +268,7 @@
           <a:p>
             <a:fld id="{3142FF6B-364E-417A-9BD9-09AA735E4DDF}" type="datetimeFigureOut">
               <a:rPr lang="en-IN" smtClean="0"/>
-              <a:t>22-02-2024</a:t>
+              <a:t>22-03-2024</a:t>
             </a:fld>
             <a:endParaRPr lang="en-IN"/>
           </a:p>
@@ -468,7 +468,7 @@
           <a:p>
             <a:fld id="{3142FF6B-364E-417A-9BD9-09AA735E4DDF}" type="datetimeFigureOut">
               <a:rPr lang="en-IN" smtClean="0"/>
-              <a:t>22-02-2024</a:t>
+              <a:t>22-03-2024</a:t>
             </a:fld>
             <a:endParaRPr lang="en-IN"/>
           </a:p>
@@ -678,7 +678,7 @@
           <a:p>
             <a:fld id="{3142FF6B-364E-417A-9BD9-09AA735E4DDF}" type="datetimeFigureOut">
               <a:rPr lang="en-IN" smtClean="0"/>
-              <a:t>22-02-2024</a:t>
+              <a:t>22-03-2024</a:t>
             </a:fld>
             <a:endParaRPr lang="en-IN"/>
           </a:p>
@@ -878,7 +878,7 @@
           <a:p>
             <a:fld id="{3142FF6B-364E-417A-9BD9-09AA735E4DDF}" type="datetimeFigureOut">
               <a:rPr lang="en-IN" smtClean="0"/>
-              <a:t>22-02-2024</a:t>
+              <a:t>22-03-2024</a:t>
             </a:fld>
             <a:endParaRPr lang="en-IN"/>
           </a:p>
@@ -1154,7 +1154,7 @@
           <a:p>
             <a:fld id="{3142FF6B-364E-417A-9BD9-09AA735E4DDF}" type="datetimeFigureOut">
               <a:rPr lang="en-IN" smtClean="0"/>
-              <a:t>22-02-2024</a:t>
+              <a:t>22-03-2024</a:t>
             </a:fld>
             <a:endParaRPr lang="en-IN"/>
           </a:p>
@@ -1422,7 +1422,7 @@
           <a:p>
             <a:fld id="{3142FF6B-364E-417A-9BD9-09AA735E4DDF}" type="datetimeFigureOut">
               <a:rPr lang="en-IN" smtClean="0"/>
-              <a:t>22-02-2024</a:t>
+              <a:t>22-03-2024</a:t>
             </a:fld>
             <a:endParaRPr lang="en-IN"/>
           </a:p>
@@ -1837,7 +1837,7 @@
           <a:p>
             <a:fld id="{3142FF6B-364E-417A-9BD9-09AA735E4DDF}" type="datetimeFigureOut">
               <a:rPr lang="en-IN" smtClean="0"/>
-              <a:t>22-02-2024</a:t>
+              <a:t>22-03-2024</a:t>
             </a:fld>
             <a:endParaRPr lang="en-IN"/>
           </a:p>
@@ -1979,7 +1979,7 @@
           <a:p>
             <a:fld id="{3142FF6B-364E-417A-9BD9-09AA735E4DDF}" type="datetimeFigureOut">
               <a:rPr lang="en-IN" smtClean="0"/>
-              <a:t>22-02-2024</a:t>
+              <a:t>22-03-2024</a:t>
             </a:fld>
             <a:endParaRPr lang="en-IN"/>
           </a:p>
@@ -2092,7 +2092,7 @@
           <a:p>
             <a:fld id="{3142FF6B-364E-417A-9BD9-09AA735E4DDF}" type="datetimeFigureOut">
               <a:rPr lang="en-IN" smtClean="0"/>
-              <a:t>22-02-2024</a:t>
+              <a:t>22-03-2024</a:t>
             </a:fld>
             <a:endParaRPr lang="en-IN"/>
           </a:p>
@@ -2405,7 +2405,7 @@
           <a:p>
             <a:fld id="{3142FF6B-364E-417A-9BD9-09AA735E4DDF}" type="datetimeFigureOut">
               <a:rPr lang="en-IN" smtClean="0"/>
-              <a:t>22-02-2024</a:t>
+              <a:t>22-03-2024</a:t>
             </a:fld>
             <a:endParaRPr lang="en-IN"/>
           </a:p>
@@ -2694,7 +2694,7 @@
           <a:p>
             <a:fld id="{3142FF6B-364E-417A-9BD9-09AA735E4DDF}" type="datetimeFigureOut">
               <a:rPr lang="en-IN" smtClean="0"/>
-              <a:t>22-02-2024</a:t>
+              <a:t>22-03-2024</a:t>
             </a:fld>
             <a:endParaRPr lang="en-IN"/>
           </a:p>
@@ -2937,7 +2937,7 @@
           <a:p>
             <a:fld id="{3142FF6B-364E-417A-9BD9-09AA735E4DDF}" type="datetimeFigureOut">
               <a:rPr lang="en-IN" smtClean="0"/>
-              <a:t>22-02-2024</a:t>
+              <a:t>22-03-2024</a:t>
             </a:fld>
             <a:endParaRPr lang="en-IN"/>
           </a:p>
@@ -5770,10 +5770,10 @@
       </p:grpSpPr>
       <p:grpSp>
         <p:nvGrpSpPr>
-          <p:cNvPr id="4" name="Group 3">
-            <a:extLst>
-              <a:ext uri="{FF2B5EF4-FFF2-40B4-BE49-F238E27FC236}">
-                <a16:creationId xmlns:a16="http://schemas.microsoft.com/office/drawing/2014/main" id="{E4FFE01D-633A-4DA4-322D-01EE4B6A4F90}"/>
+          <p:cNvPr id="9" name="Group 8">
+            <a:extLst>
+              <a:ext uri="{FF2B5EF4-FFF2-40B4-BE49-F238E27FC236}">
+                <a16:creationId xmlns:a16="http://schemas.microsoft.com/office/drawing/2014/main" id="{256D8821-C60E-FCC3-4AF3-DB85A72A6969}"/>
               </a:ext>
             </a:extLst>
           </p:cNvPr>
@@ -5782,10 +5782,10 @@
         </p:nvGrpSpPr>
         <p:grpSpPr>
           <a:xfrm>
-            <a:off x="5262282" y="1308847"/>
-            <a:ext cx="6704091" cy="4166790"/>
-            <a:chOff x="4818033" y="1028375"/>
-            <a:chExt cx="7118141" cy="4674301"/>
+            <a:off x="1239710" y="543250"/>
+            <a:ext cx="9513848" cy="5913136"/>
+            <a:chOff x="1239710" y="543250"/>
+            <a:chExt cx="9513848" cy="5913136"/>
           </a:xfrm>
         </p:grpSpPr>
         <p:pic>
@@ -5815,8 +5815,8 @@
           </p:blipFill>
           <p:spPr>
             <a:xfrm>
-              <a:off x="4818033" y="1028375"/>
-              <a:ext cx="7118141" cy="4674301"/>
+              <a:off x="1239710" y="543250"/>
+              <a:ext cx="9513848" cy="5913136"/>
             </a:xfrm>
             <a:prstGeom prst="rect">
               <a:avLst/>
@@ -5835,10 +5835,61 @@
         </p:pic>
         <p:sp>
           <p:nvSpPr>
-            <p:cNvPr id="7" name="TextBox 6">
+            <p:cNvPr id="3" name="Oval 2">
               <a:extLst>
                 <a:ext uri="{FF2B5EF4-FFF2-40B4-BE49-F238E27FC236}">
-                  <a16:creationId xmlns:a16="http://schemas.microsoft.com/office/drawing/2014/main" id="{8A52DAA4-69E2-27EA-821E-B471A84A57EA}"/>
+                  <a16:creationId xmlns:a16="http://schemas.microsoft.com/office/drawing/2014/main" id="{400C3DF1-457E-BC41-7384-2E4703DA9F8A}"/>
+                </a:ext>
+              </a:extLst>
+            </p:cNvPr>
+            <p:cNvSpPr/>
+            <p:nvPr/>
+          </p:nvSpPr>
+          <p:spPr>
+            <a:xfrm>
+              <a:off x="7156943" y="5071231"/>
+              <a:ext cx="121298" cy="121298"/>
+            </a:xfrm>
+            <a:prstGeom prst="ellipse">
+              <a:avLst/>
+            </a:prstGeom>
+            <a:solidFill>
+              <a:srgbClr val="FFFF00"/>
+            </a:solidFill>
+          </p:spPr>
+          <p:style>
+            <a:lnRef idx="0">
+              <a:schemeClr val="accent4"/>
+            </a:lnRef>
+            <a:fillRef idx="3">
+              <a:schemeClr val="accent4"/>
+            </a:fillRef>
+            <a:effectRef idx="3">
+              <a:schemeClr val="accent4"/>
+            </a:effectRef>
+            <a:fontRef idx="minor">
+              <a:schemeClr val="lt1"/>
+            </a:fontRef>
+          </p:style>
+          <p:txBody>
+            <a:bodyPr rtlCol="0" anchor="ctr"/>
+            <a:lstStyle/>
+            <a:p>
+              <a:pPr algn="ctr"/>
+              <a:endParaRPr lang="en-IN" dirty="0">
+                <a:highlight>
+                  <a:srgbClr val="FFFF00"/>
+                </a:highlight>
+              </a:endParaRPr>
+            </a:p>
+          </p:txBody>
+        </p:sp>
+        <p:sp>
+          <p:nvSpPr>
+            <p:cNvPr id="5" name="TextBox 4">
+              <a:extLst>
+                <a:ext uri="{FF2B5EF4-FFF2-40B4-BE49-F238E27FC236}">
+                  <a16:creationId xmlns:a16="http://schemas.microsoft.com/office/drawing/2014/main" id="{E424FA0A-31FA-27B1-29E7-E3A0D40105BC}"/>
                 </a:ext>
               </a:extLst>
             </p:cNvPr>
@@ -5847,8 +5898,8 @@
           </p:nvSpPr>
           <p:spPr>
             <a:xfrm>
-              <a:off x="9112291" y="4784411"/>
-              <a:ext cx="2823883" cy="914949"/>
+              <a:off x="7296308" y="4931825"/>
+              <a:ext cx="2618657" cy="800219"/>
             </a:xfrm>
             <a:prstGeom prst="rect">
               <a:avLst/>
@@ -5862,146 +5913,95 @@
             <a:lstStyle/>
             <a:p>
               <a:r>
-                <a:rPr lang="en-GB" sz="1200" b="1" dirty="0">
-                  <a:solidFill>
-                    <a:schemeClr val="bg1"/>
-                  </a:solidFill>
-                </a:rPr>
+                <a:rPr lang="en-IN" sz="1400" dirty="0"/>
                 <a:t>Work</a:t>
               </a:r>
               <a:r>
-                <a:rPr lang="en-GB" sz="1100" b="1" dirty="0">
+                <a:rPr lang="en-IN" dirty="0"/>
+                <a:t> </a:t>
+              </a:r>
+              <a:r>
+                <a:rPr lang="en-IN" sz="1400" dirty="0"/>
+                <a:t>Locations</a:t>
+              </a:r>
+              <a:endParaRPr lang="en-IN" dirty="0"/>
+            </a:p>
+            <a:p>
+              <a:pPr algn="l"/>
+              <a:r>
+                <a:rPr lang="en-IN" sz="1400" b="0" i="0" u="none" strike="noStrike" baseline="0" dirty="0"/>
+                <a:t>Registered</a:t>
+              </a:r>
+            </a:p>
+            <a:p>
+              <a:pPr algn="l"/>
+              <a:r>
+                <a:rPr lang="en-IN" sz="1400" b="0" i="0" u="none" strike="noStrike" baseline="0" dirty="0"/>
+                <a:t>Office</a:t>
+              </a:r>
+              <a:r>
+                <a:rPr lang="en-IN" sz="1400" b="0" i="0" u="none" strike="noStrike" baseline="0" dirty="0">
                   <a:solidFill>
-                    <a:schemeClr val="bg1"/>
+                    <a:srgbClr val="1D262D"/>
                   </a:solidFill>
                 </a:rPr>
                 <a:t> </a:t>
               </a:r>
               <a:r>
-                <a:rPr lang="en-GB" sz="1200" b="1" dirty="0">
-                  <a:solidFill>
-                    <a:schemeClr val="bg1"/>
-                  </a:solidFill>
-                </a:rPr>
-                <a:t>locations</a:t>
-              </a:r>
-              <a:endParaRPr lang="en-GB" sz="1100" b="1" dirty="0">
-                <a:solidFill>
-                  <a:schemeClr val="bg1"/>
-                </a:solidFill>
-              </a:endParaRPr>
-            </a:p>
-            <a:p>
-              <a:endParaRPr lang="en-GB" sz="1100" b="1" dirty="0">
-                <a:solidFill>
-                  <a:schemeClr val="bg1"/>
-                </a:solidFill>
-              </a:endParaRPr>
-            </a:p>
-            <a:p>
-              <a:r>
-                <a:rPr lang="en-GB" sz="1100" b="1" dirty="0">
-                  <a:solidFill>
-                    <a:schemeClr val="bg1"/>
-                  </a:solidFill>
-                </a:rPr>
-                <a:t> </a:t>
-              </a:r>
-              <a:r>
-                <a:rPr lang="en-GB" sz="1200" b="1" dirty="0">
-                  <a:solidFill>
-                    <a:schemeClr val="bg1"/>
-                  </a:solidFill>
-                </a:rPr>
-                <a:t>Registered</a:t>
-              </a:r>
-              <a:r>
-                <a:rPr lang="en-GB" sz="1100" b="1" dirty="0">
-                  <a:solidFill>
-                    <a:schemeClr val="bg1"/>
-                  </a:solidFill>
-                </a:rPr>
-                <a:t> </a:t>
-              </a:r>
-              <a:r>
-                <a:rPr lang="en-GB" sz="1200" b="1" dirty="0">
-                  <a:solidFill>
-                    <a:schemeClr val="bg1"/>
-                  </a:solidFill>
-                </a:rPr>
-                <a:t>Office</a:t>
-              </a:r>
-            </a:p>
-            <a:p>
-              <a:r>
-                <a:rPr lang="en-GB" sz="1100" b="1" dirty="0">
-                  <a:solidFill>
-                    <a:schemeClr val="bg1"/>
-                  </a:solidFill>
-                </a:rPr>
-                <a:t> </a:t>
-              </a:r>
-              <a:r>
-                <a:rPr lang="en-GB" sz="1200" b="1" dirty="0">
-                  <a:solidFill>
-                    <a:schemeClr val="bg1"/>
-                  </a:solidFill>
-                </a:rPr>
+                <a:rPr lang="en-IN" sz="1400" b="0" i="0" u="none" strike="noStrike" baseline="0" dirty="0"/>
                 <a:t>Location</a:t>
               </a:r>
-              <a:endParaRPr lang="en-IN" sz="1100" b="1" dirty="0">
-                <a:solidFill>
-                  <a:schemeClr val="bg1"/>
-                </a:solidFill>
-              </a:endParaRPr>
+              <a:endParaRPr lang="en-IN" dirty="0"/>
             </a:p>
           </p:txBody>
         </p:sp>
+        <p:pic>
+          <p:nvPicPr>
+            <p:cNvPr id="6" name="Graphic 5" descr="Flag">
+              <a:extLst>
+                <a:ext uri="{FF2B5EF4-FFF2-40B4-BE49-F238E27FC236}">
+                  <a16:creationId xmlns:a16="http://schemas.microsoft.com/office/drawing/2014/main" id="{E2CC5B69-F86A-9B21-002D-1D3114A14764}"/>
+                </a:ext>
+              </a:extLst>
+            </p:cNvPr>
+            <p:cNvPicPr>
+              <a:picLocks noChangeAspect="1"/>
+            </p:cNvPicPr>
+            <p:nvPr/>
+          </p:nvPicPr>
+          <p:blipFill>
+            <a:blip r:embed="rId3">
+              <a:extLst>
+                <a:ext uri="{28A0092B-C50C-407E-A947-70E740481C1C}">
+                  <a14:useLocalDpi xmlns:a14="http://schemas.microsoft.com/office/drawing/2010/main" val="0"/>
+                </a:ext>
+                <a:ext uri="{96DAC541-7B7A-43D3-8B79-37D633B846F1}">
+                  <asvg:svgBlip xmlns:asvg="http://schemas.microsoft.com/office/drawing/2016/SVG/main" r:embed="rId4"/>
+                </a:ext>
+              </a:extLst>
+            </a:blip>
+            <a:stretch>
+              <a:fillRect/>
+            </a:stretch>
+          </p:blipFill>
+          <p:spPr>
+            <a:xfrm>
+              <a:off x="7051974" y="5331934"/>
+              <a:ext cx="331236" cy="331236"/>
+            </a:xfrm>
+            <a:prstGeom prst="rect">
+              <a:avLst/>
+            </a:prstGeom>
+            <a:effectLst>
+              <a:outerShdw blurRad="50800" dist="38100" dir="5400000" algn="t" rotWithShape="0">
+                <a:prstClr val="black">
+                  <a:alpha val="40000"/>
+                </a:prstClr>
+              </a:outerShdw>
+            </a:effectLst>
+          </p:spPr>
+        </p:pic>
       </p:grpSp>
-      <p:sp>
-        <p:nvSpPr>
-          <p:cNvPr id="25" name="Oval 24">
-            <a:extLst>
-              <a:ext uri="{FF2B5EF4-FFF2-40B4-BE49-F238E27FC236}">
-                <a16:creationId xmlns:a16="http://schemas.microsoft.com/office/drawing/2014/main" id="{350A7E56-BC1A-0490-A4A3-85ED1AF930B5}"/>
-              </a:ext>
-            </a:extLst>
-          </p:cNvPr>
-          <p:cNvSpPr/>
-          <p:nvPr/>
-        </p:nvSpPr>
-        <p:spPr>
-          <a:xfrm>
-            <a:off x="9190210" y="4742329"/>
-            <a:ext cx="116541" cy="107576"/>
-          </a:xfrm>
-          <a:prstGeom prst="ellipse">
-            <a:avLst/>
-          </a:prstGeom>
-        </p:spPr>
-        <p:style>
-          <a:lnRef idx="1">
-            <a:schemeClr val="accent1"/>
-          </a:lnRef>
-          <a:fillRef idx="3">
-            <a:schemeClr val="accent1"/>
-          </a:fillRef>
-          <a:effectRef idx="2">
-            <a:schemeClr val="accent1"/>
-          </a:effectRef>
-          <a:fontRef idx="minor">
-            <a:schemeClr val="lt1"/>
-          </a:fontRef>
-        </p:style>
-        <p:txBody>
-          <a:bodyPr rtlCol="0" anchor="ctr"/>
-          <a:lstStyle/>
-          <a:p>
-            <a:pPr algn="ctr"/>
-            <a:endParaRPr lang="en-IN"/>
-          </a:p>
-        </p:txBody>
-      </p:sp>
     </p:spTree>
     <p:extLst>
       <p:ext uri="{BB962C8B-B14F-4D97-AF65-F5344CB8AC3E}">

</xml_diff>